<commit_message>
diapo nova mapa cat
</commit_message>
<xml_diff>
--- a/FinalPresentation_Template_authors.pptx
+++ b/FinalPresentation_Template_authors.pptx
@@ -11,6 +11,7 @@
     <p:sldId id="258" r:id="rId6"/>
     <p:sldId id="259" r:id="rId7"/>
     <p:sldId id="260" r:id="rId8"/>
+    <p:sldId id="261" r:id="rId9"/>
   </p:sldIdLst>
   <p:sldSz cx="9144000" cy="6858000"/>
   <p:notesSz cx="7559675" cy="10691812"/>
@@ -2800,7 +2801,7 @@
         <p:spPr>
           <a:xfrm>
             <a:off x="6372360" y="135000"/>
-            <a:ext cx="2591640" cy="700920"/>
+            <a:ext cx="2591280" cy="700560"/>
           </a:xfrm>
           <a:prstGeom prst="rect">
             <a:avLst/>
@@ -2822,8 +2823,8 @@
         </p:nvSpPr>
         <p:spPr>
           <a:xfrm>
-            <a:off x="288000" y="1143000"/>
-            <a:ext cx="8567280" cy="456480"/>
+            <a:off x="457200" y="273600"/>
+            <a:ext cx="8228880" cy="1144440"/>
           </a:xfrm>
           <a:prstGeom prst="rect">
             <a:avLst/>
@@ -2883,7 +2884,7 @@
         <p:spPr>
           <a:xfrm>
             <a:off x="457200" y="1604520"/>
-            <a:ext cx="8229240" cy="3977280"/>
+            <a:ext cx="8228880" cy="3976920"/>
           </a:xfrm>
           <a:prstGeom prst="rect">
             <a:avLst/>
@@ -2906,12 +2907,12 @@
               <a:buChar char=""/>
             </a:pPr>
             <a:r>
-              <a:rPr b="0" lang="es-ES" sz="3200" spc="-1" strike="noStrike">
+              <a:rPr b="0" lang="es-ES" sz="1800" spc="-1" strike="noStrike">
                 <a:latin typeface="Arial"/>
               </a:rPr>
               <a:t>Pulse para editar el formato de texto del esquema</a:t>
             </a:r>
-            <a:endParaRPr b="0" lang="es-ES" sz="3200" spc="-1" strike="noStrike">
+            <a:endParaRPr b="0" lang="es-ES" sz="1800" spc="-1" strike="noStrike">
               <a:latin typeface="Arial"/>
             </a:endParaRPr>
           </a:p>
@@ -2928,12 +2929,12 @@
               <a:buChar char=""/>
             </a:pPr>
             <a:r>
-              <a:rPr b="0" lang="es-ES" sz="2800" spc="-1" strike="noStrike">
+              <a:rPr b="0" lang="es-ES" sz="1800" spc="-1" strike="noStrike">
                 <a:latin typeface="Arial"/>
               </a:rPr>
               <a:t>Segundo nivel del esquema</a:t>
             </a:r>
-            <a:endParaRPr b="0" lang="es-ES" sz="2800" spc="-1" strike="noStrike">
+            <a:endParaRPr b="0" lang="es-ES" sz="1800" spc="-1" strike="noStrike">
               <a:latin typeface="Arial"/>
             </a:endParaRPr>
           </a:p>
@@ -2950,12 +2951,12 @@
               <a:buChar char=""/>
             </a:pPr>
             <a:r>
-              <a:rPr b="0" lang="es-ES" sz="2400" spc="-1" strike="noStrike">
+              <a:rPr b="0" lang="es-ES" sz="1800" spc="-1" strike="noStrike">
                 <a:latin typeface="Arial"/>
               </a:rPr>
               <a:t>Tercer nivel del esquema</a:t>
             </a:r>
-            <a:endParaRPr b="0" lang="es-ES" sz="2400" spc="-1" strike="noStrike">
+            <a:endParaRPr b="0" lang="es-ES" sz="1800" spc="-1" strike="noStrike">
               <a:latin typeface="Arial"/>
             </a:endParaRPr>
           </a:p>
@@ -2972,12 +2973,12 @@
               <a:buChar char=""/>
             </a:pPr>
             <a:r>
-              <a:rPr b="0" lang="es-ES" sz="2000" spc="-1" strike="noStrike">
+              <a:rPr b="0" lang="es-ES" sz="1800" spc="-1" strike="noStrike">
                 <a:latin typeface="Arial"/>
               </a:rPr>
               <a:t>Cuarto nivel del esquema</a:t>
             </a:r>
-            <a:endParaRPr b="0" lang="es-ES" sz="2000" spc="-1" strike="noStrike">
+            <a:endParaRPr b="0" lang="es-ES" sz="1800" spc="-1" strike="noStrike">
               <a:latin typeface="Arial"/>
             </a:endParaRPr>
           </a:p>
@@ -2994,12 +2995,12 @@
               <a:buChar char=""/>
             </a:pPr>
             <a:r>
-              <a:rPr b="0" lang="es-ES" sz="2000" spc="-1" strike="noStrike">
+              <a:rPr b="0" lang="es-ES" sz="1800" spc="-1" strike="noStrike">
                 <a:latin typeface="Arial"/>
               </a:rPr>
               <a:t>Quinto nivel del esquema</a:t>
             </a:r>
-            <a:endParaRPr b="0" lang="es-ES" sz="2000" spc="-1" strike="noStrike">
+            <a:endParaRPr b="0" lang="es-ES" sz="1800" spc="-1" strike="noStrike">
               <a:latin typeface="Arial"/>
             </a:endParaRPr>
           </a:p>
@@ -3016,12 +3017,12 @@
               <a:buChar char=""/>
             </a:pPr>
             <a:r>
-              <a:rPr b="0" lang="es-ES" sz="2000" spc="-1" strike="noStrike">
+              <a:rPr b="0" lang="es-ES" sz="1800" spc="-1" strike="noStrike">
                 <a:latin typeface="Arial"/>
               </a:rPr>
               <a:t>Sexto nivel del esquema</a:t>
             </a:r>
-            <a:endParaRPr b="0" lang="es-ES" sz="2000" spc="-1" strike="noStrike">
+            <a:endParaRPr b="0" lang="es-ES" sz="1800" spc="-1" strike="noStrike">
               <a:latin typeface="Arial"/>
             </a:endParaRPr>
           </a:p>
@@ -3038,12 +3039,12 @@
               <a:buChar char=""/>
             </a:pPr>
             <a:r>
-              <a:rPr b="0" lang="es-ES" sz="2000" spc="-1" strike="noStrike">
+              <a:rPr b="0" lang="es-ES" sz="1800" spc="-1" strike="noStrike">
                 <a:latin typeface="Arial"/>
               </a:rPr>
               <a:t>Séptimo nivel del esquema</a:t>
             </a:r>
-            <a:endParaRPr b="0" lang="es-ES" sz="2000" spc="-1" strike="noStrike">
+            <a:endParaRPr b="0" lang="es-ES" sz="1800" spc="-1" strike="noStrike">
               <a:latin typeface="Arial"/>
             </a:endParaRPr>
           </a:p>
@@ -3140,7 +3141,7 @@
         <p:spPr>
           <a:xfrm>
             <a:off x="6372360" y="135000"/>
-            <a:ext cx="2591640" cy="700920"/>
+            <a:ext cx="2591280" cy="700560"/>
           </a:xfrm>
           <a:prstGeom prst="rect">
             <a:avLst/>
@@ -3163,7 +3164,7 @@
         <p:spPr>
           <a:xfrm>
             <a:off x="5724360" y="1700280"/>
-            <a:ext cx="3437640" cy="5157000"/>
+            <a:ext cx="3437280" cy="5156640"/>
           </a:xfrm>
           <a:prstGeom prst="rect">
             <a:avLst/>
@@ -3513,7 +3514,7 @@
         <p:spPr>
           <a:xfrm>
             <a:off x="0" y="2130480"/>
-            <a:ext cx="9143280" cy="1469160"/>
+            <a:ext cx="9142920" cy="1468800"/>
           </a:xfrm>
           <a:prstGeom prst="rect">
             <a:avLst/>
@@ -3564,7 +3565,7 @@
         <p:spPr>
           <a:xfrm>
             <a:off x="0" y="4365000"/>
-            <a:ext cx="9143280" cy="1751760"/>
+            <a:ext cx="9142920" cy="1751400"/>
           </a:xfrm>
           <a:prstGeom prst="rect">
             <a:avLst/>
@@ -3673,7 +3674,7 @@
         <p:spPr>
           <a:xfrm>
             <a:off x="6553080" y="6356520"/>
-            <a:ext cx="2133000" cy="364320"/>
+            <a:ext cx="2132640" cy="363960"/>
           </a:xfrm>
           <a:prstGeom prst="rect">
             <a:avLst/>
@@ -3699,7 +3700,7 @@
                 <a:spcPct val="100000"/>
               </a:lnSpc>
             </a:pPr>
-            <a:fld id="{86D4DDAF-3989-4A4A-8A3C-C5AE69D29E9B}" type="slidenum">
+            <a:fld id="{EDB6C9A9-AECA-48B7-A4A9-EABD36337AF0}" type="slidenum">
               <a:rPr b="0" lang="es-ES_tradnl" sz="1200" spc="-1" strike="noStrike">
                 <a:solidFill>
                   <a:srgbClr val="898989"/>
@@ -3754,7 +3755,7 @@
         <p:spPr>
           <a:xfrm>
             <a:off x="288000" y="1143000"/>
-            <a:ext cx="8567280" cy="456480"/>
+            <a:ext cx="8566920" cy="456120"/>
           </a:xfrm>
           <a:prstGeom prst="rect">
             <a:avLst/>
@@ -3805,7 +3806,7 @@
         <p:spPr>
           <a:xfrm>
             <a:off x="288000" y="417600"/>
-            <a:ext cx="5197680" cy="115200"/>
+            <a:ext cx="5197320" cy="114840"/>
           </a:xfrm>
           <a:prstGeom prst="rect">
             <a:avLst/>
@@ -3826,7 +3827,7 @@
             <a:noAutofit/>
           </a:bodyPr>
           <a:p>
-            <a:pPr marL="343080" indent="-342360">
+            <a:pPr marL="343080" indent="-342000">
               <a:lnSpc>
                 <a:spcPts val="1001"/>
               </a:lnSpc>
@@ -3849,7 +3850,7 @@
             </a:endParaRPr>
           </a:p>
           <a:p>
-            <a:pPr marL="343080" indent="-342360">
+            <a:pPr marL="343080" indent="-342000">
               <a:lnSpc>
                 <a:spcPts val="1001"/>
               </a:lnSpc>
@@ -3872,7 +3873,7 @@
         <p:spPr>
           <a:xfrm>
             <a:off x="288000" y="536400"/>
-            <a:ext cx="5197680" cy="227880"/>
+            <a:ext cx="5197320" cy="227520"/>
           </a:xfrm>
           <a:prstGeom prst="rect">
             <a:avLst/>
@@ -3893,7 +3894,7 @@
             <a:noAutofit/>
           </a:bodyPr>
           <a:p>
-            <a:pPr marL="343080" indent="-342360">
+            <a:pPr marL="343080" indent="-342000">
               <a:lnSpc>
                 <a:spcPct val="100000"/>
               </a:lnSpc>
@@ -3942,7 +3943,7 @@
         <p:spPr>
           <a:xfrm>
             <a:off x="288000" y="1800000"/>
-            <a:ext cx="8567280" cy="922680"/>
+            <a:ext cx="8566920" cy="922320"/>
           </a:xfrm>
           <a:prstGeom prst="rect">
             <a:avLst/>
@@ -4022,7 +4023,7 @@
         <p:spPr>
           <a:xfrm>
             <a:off x="8610480" y="6356520"/>
-            <a:ext cx="245520" cy="364320"/>
+            <a:ext cx="245160" cy="363960"/>
           </a:xfrm>
           <a:prstGeom prst="rect">
             <a:avLst/>
@@ -4048,7 +4049,7 @@
                 <a:spcPct val="100000"/>
               </a:lnSpc>
             </a:pPr>
-            <a:fld id="{9CB9CB9D-600A-45AF-95D5-ED1E90E85F58}" type="slidenum">
+            <a:fld id="{0A6E001D-4D98-482C-B866-DCC3CE278C81}" type="slidenum">
               <a:rPr b="0" lang="es-ES_tradnl" sz="800" spc="-1" strike="noStrike">
                 <a:solidFill>
                   <a:srgbClr val="000000"/>
@@ -4103,7 +4104,7 @@
         <p:spPr>
           <a:xfrm>
             <a:off x="288000" y="1143000"/>
-            <a:ext cx="8567280" cy="456480"/>
+            <a:ext cx="8566920" cy="456120"/>
           </a:xfrm>
           <a:prstGeom prst="rect">
             <a:avLst/>
@@ -4154,7 +4155,7 @@
         <p:spPr>
           <a:xfrm>
             <a:off x="288000" y="417600"/>
-            <a:ext cx="5197680" cy="115200"/>
+            <a:ext cx="5197320" cy="114840"/>
           </a:xfrm>
           <a:prstGeom prst="rect">
             <a:avLst/>
@@ -4175,7 +4176,7 @@
             <a:noAutofit/>
           </a:bodyPr>
           <a:p>
-            <a:pPr marL="343080" indent="-342360">
+            <a:pPr marL="343080" indent="-342000">
               <a:lnSpc>
                 <a:spcPts val="1001"/>
               </a:lnSpc>
@@ -4198,7 +4199,7 @@
             </a:endParaRPr>
           </a:p>
           <a:p>
-            <a:pPr marL="343080" indent="-342360">
+            <a:pPr marL="343080" indent="-342000">
               <a:lnSpc>
                 <a:spcPts val="1001"/>
               </a:lnSpc>
@@ -4221,7 +4222,7 @@
         <p:spPr>
           <a:xfrm>
             <a:off x="288000" y="536400"/>
-            <a:ext cx="5197680" cy="227880"/>
+            <a:ext cx="5197320" cy="227520"/>
           </a:xfrm>
           <a:prstGeom prst="rect">
             <a:avLst/>
@@ -4242,7 +4243,7 @@
             <a:noAutofit/>
           </a:bodyPr>
           <a:p>
-            <a:pPr marL="343080" indent="-342360">
+            <a:pPr marL="343080" indent="-342000">
               <a:lnSpc>
                 <a:spcPct val="100000"/>
               </a:lnSpc>
@@ -4291,7 +4292,7 @@
         <p:spPr>
           <a:xfrm>
             <a:off x="287280" y="1575360"/>
-            <a:ext cx="8567280" cy="4923720"/>
+            <a:ext cx="8566920" cy="4923360"/>
           </a:xfrm>
           <a:prstGeom prst="rect">
             <a:avLst/>
@@ -4897,7 +4898,7 @@
         <p:spPr>
           <a:xfrm>
             <a:off x="8610480" y="6356520"/>
-            <a:ext cx="245520" cy="364320"/>
+            <a:ext cx="245160" cy="363960"/>
           </a:xfrm>
           <a:prstGeom prst="rect">
             <a:avLst/>
@@ -4923,7 +4924,7 @@
                 <a:spcPct val="100000"/>
               </a:lnSpc>
             </a:pPr>
-            <a:fld id="{814EA86B-1FC5-4CD8-8FBA-C935F75141CF}" type="slidenum">
+            <a:fld id="{60CD0AF4-21C8-40AE-BC8C-DA25486A9849}" type="slidenum">
               <a:rPr b="0" lang="es-ES_tradnl" sz="800" spc="-1" strike="noStrike">
                 <a:solidFill>
                   <a:srgbClr val="000000"/>
@@ -4977,8 +4978,8 @@
         </p:nvSpPr>
         <p:spPr>
           <a:xfrm>
-            <a:off x="288000" y="1099440"/>
-            <a:ext cx="8567280" cy="456480"/>
+            <a:off x="286920" y="424440"/>
+            <a:ext cx="5197320" cy="114840"/>
           </a:xfrm>
           <a:prstGeom prst="rect">
             <a:avLst/>
@@ -4999,22 +5000,38 @@
             <a:noAutofit/>
           </a:bodyPr>
           <a:p>
-            <a:pPr>
+            <a:pPr marL="343080" indent="-342000">
               <a:lnSpc>
-                <a:spcPct val="100000"/>
+                <a:spcPts val="1001"/>
               </a:lnSpc>
+              <a:tabLst>
+                <a:tab algn="l" pos="0"/>
+              </a:tabLst>
             </a:pPr>
             <a:r>
-              <a:rPr b="1" lang="es-ES" sz="2000" spc="-1" strike="noStrike">
+              <a:rPr b="1" lang="es-ES" sz="800" spc="-1" strike="noStrike">
                 <a:solidFill>
-                  <a:srgbClr val="0059a2"/>
+                  <a:srgbClr val="000000"/>
                 </a:solidFill>
                 <a:latin typeface="Arial"/>
                 <a:ea typeface="ＭＳ Ｐゴシック"/>
               </a:rPr>
-              <a:t>Author contributions - CRediT Contributor Roles Taxonomy </a:t>
-            </a:r>
-            <a:endParaRPr b="0" lang="es-ES" sz="2000" spc="-1" strike="noStrike">
+              <a:t>MSc Physics of Complex Systems and Biophysics</a:t>
+            </a:r>
+            <a:endParaRPr b="0" lang="es-ES" sz="800" spc="-1" strike="noStrike">
+              <a:latin typeface="Arial"/>
+            </a:endParaRPr>
+          </a:p>
+          <a:p>
+            <a:pPr marL="343080" indent="-342000">
+              <a:lnSpc>
+                <a:spcPts val="1001"/>
+              </a:lnSpc>
+              <a:tabLst>
+                <a:tab algn="l" pos="0"/>
+              </a:tabLst>
+            </a:pPr>
+            <a:endParaRPr b="0" lang="es-ES" sz="800" spc="-1" strike="noStrike">
               <a:latin typeface="Arial"/>
             </a:endParaRPr>
           </a:p>
@@ -5028,8 +5045,8 @@
         </p:nvSpPr>
         <p:spPr>
           <a:xfrm>
-            <a:off x="8610480" y="6356520"/>
-            <a:ext cx="245520" cy="364320"/>
+            <a:off x="286920" y="536400"/>
+            <a:ext cx="5197320" cy="227520"/>
           </a:xfrm>
           <a:prstGeom prst="rect">
             <a:avLst/>
@@ -5050,21 +5067,40 @@
             <a:noAutofit/>
           </a:bodyPr>
           <a:p>
-            <a:pPr algn="r">
+            <a:pPr marL="343080" indent="-342000">
               <a:lnSpc>
                 <a:spcPct val="100000"/>
               </a:lnSpc>
+              <a:spcBef>
+                <a:spcPts val="159"/>
+              </a:spcBef>
+              <a:tabLst>
+                <a:tab algn="l" pos="0"/>
+              </a:tabLst>
             </a:pPr>
-            <a:fld id="{D58C4B2F-0C6A-4985-9A1E-53A2066A7048}" type="slidenum">
-              <a:rPr b="0" lang="es-ES_tradnl" sz="800" spc="-1" strike="noStrike">
+            <a:r>
+              <a:rPr b="0" lang="es-ES" sz="800" spc="-1" strike="noStrike">
                 <a:solidFill>
                   <a:srgbClr val="000000"/>
                 </a:solidFill>
                 <a:latin typeface="Arial"/>
                 <a:ea typeface="ＭＳ Ｐゴシック"/>
               </a:rPr>
-              <a:t>&lt;número&gt;</a:t>
-            </a:fld>
+              <a:t>Analysis and Visualization of Big Data – Final Presentation - </a:t>
+            </a:r>
+            <a:r>
+              <a:rPr b="0" lang="es-ES" sz="800" spc="-1" strike="noStrike">
+                <a:solidFill>
+                  <a:srgbClr val="000000"/>
+                </a:solidFill>
+                <a:highlight>
+                  <a:srgbClr val="ffff00"/>
+                </a:highlight>
+                <a:latin typeface="Arial"/>
+                <a:ea typeface="ＭＳ Ｐゴシック"/>
+              </a:rPr>
+              <a:t>Title</a:t>
+            </a:r>
             <a:endParaRPr b="0" lang="es-ES" sz="800" spc="-1" strike="noStrike">
               <a:latin typeface="Arial"/>
             </a:endParaRPr>
@@ -5079,8 +5115,8 @@
         </p:nvSpPr>
         <p:spPr>
           <a:xfrm>
-            <a:off x="288000" y="417600"/>
-            <a:ext cx="5197680" cy="115200"/>
+            <a:off x="283320" y="1143000"/>
+            <a:ext cx="8566920" cy="456120"/>
           </a:xfrm>
           <a:prstGeom prst="rect">
             <a:avLst/>
@@ -5101,25 +5137,22 @@
             <a:noAutofit/>
           </a:bodyPr>
           <a:p>
-            <a:pPr marL="343080" indent="-342360">
+            <a:pPr>
               <a:lnSpc>
-                <a:spcPts val="1001"/>
+                <a:spcPct val="100000"/>
               </a:lnSpc>
-              <a:tabLst>
-                <a:tab algn="l" pos="0"/>
-              </a:tabLst>
             </a:pPr>
             <a:r>
-              <a:rPr b="1" lang="es-ES" sz="800" spc="-1" strike="noStrike">
+              <a:rPr b="1" lang="es-ES" sz="2400" spc="-1" strike="noStrike">
                 <a:solidFill>
-                  <a:srgbClr val="000000"/>
+                  <a:srgbClr val="0059a2"/>
                 </a:solidFill>
                 <a:latin typeface="Arial"/>
                 <a:ea typeface="ＭＳ Ｐゴシック"/>
               </a:rPr>
-              <a:t>MSc Physics of Complex Systems and Biophysics</a:t>
-            </a:r>
-            <a:endParaRPr b="0" lang="es-ES" sz="800" spc="-1" strike="noStrike">
+              <a:t>Geographic distribution of migrants</a:t>
+            </a:r>
+            <a:endParaRPr b="0" lang="es-ES" sz="2400" spc="-1" strike="noStrike">
               <a:latin typeface="Arial"/>
             </a:endParaRPr>
           </a:p>
@@ -5127,14 +5160,464 @@
       </p:sp>
       <p:sp>
         <p:nvSpPr>
-          <p:cNvPr id="97" name="CustomShape 4"/>
+          <p:cNvPr id="97" name="TextShape 4"/>
+          <p:cNvSpPr txBox="1"/>
+          <p:nvPr/>
+        </p:nvSpPr>
+        <p:spPr>
+          <a:xfrm>
+            <a:off x="531360" y="1981800"/>
+            <a:ext cx="3284640" cy="3490200"/>
+          </a:xfrm>
+          <a:prstGeom prst="rect">
+            <a:avLst/>
+          </a:prstGeom>
+          <a:noFill/>
+          <a:ln>
+            <a:noFill/>
+          </a:ln>
+        </p:spPr>
+        <p:txBody>
+          <a:bodyPr lIns="90000" rIns="90000" tIns="45000" bIns="45000">
+            <a:noAutofit/>
+          </a:bodyPr>
+          <a:p>
+            <a:r>
+              <a:rPr b="0" lang="ca-ES" sz="2000" spc="-1" strike="noStrike">
+                <a:solidFill>
+                  <a:srgbClr val="0059a2"/>
+                </a:solidFill>
+                <a:latin typeface="Arial"/>
+                <a:ea typeface="ＭＳ Ｐゴシック"/>
+              </a:rPr>
+              <a:t>- Unusual </a:t>
+            </a:r>
+            <a:r>
+              <a:rPr b="0" lang="ca-ES" sz="2000" spc="-1" strike="noStrike">
+                <a:solidFill>
+                  <a:srgbClr val="0059a2"/>
+                </a:solidFill>
+                <a:latin typeface="Arial"/>
+                <a:ea typeface="ＭＳ Ｐゴシック"/>
+              </a:rPr>
+              <a:t>territorial </a:t>
+            </a:r>
+            <a:r>
+              <a:rPr b="0" lang="ca-ES" sz="2000" spc="-1" strike="noStrike">
+                <a:solidFill>
+                  <a:srgbClr val="0059a2"/>
+                </a:solidFill>
+                <a:latin typeface="Arial"/>
+                <a:ea typeface="ＭＳ Ｐゴシック"/>
+              </a:rPr>
+              <a:t>division</a:t>
+            </a:r>
+            <a:endParaRPr b="0" lang="es-ES" sz="2000" spc="-1" strike="noStrike">
+              <a:latin typeface="Arial"/>
+            </a:endParaRPr>
+          </a:p>
+          <a:p>
+            <a:r>
+              <a:rPr b="0" lang="ca-ES" sz="2000" spc="-1" strike="noStrike">
+                <a:solidFill>
+                  <a:srgbClr val="0059a2"/>
+                </a:solidFill>
+                <a:latin typeface="Arial"/>
+                <a:ea typeface="ＭＳ Ｐゴシック"/>
+              </a:rPr>
+              <a:t>	</a:t>
+            </a:r>
+            <a:r>
+              <a:rPr b="0" lang="ca-ES" sz="2000" spc="-1" strike="noStrike">
+                <a:solidFill>
+                  <a:srgbClr val="0059a2"/>
+                </a:solidFill>
+                <a:latin typeface="Arial"/>
+                <a:ea typeface="ＭＳ Ｐゴシック"/>
+              </a:rPr>
+              <a:t>&gt; </a:t>
+            </a:r>
+            <a:r>
+              <a:rPr b="0" lang="ca-ES" sz="2000" spc="-1" strike="noStrike">
+                <a:solidFill>
+                  <a:srgbClr val="0059a2"/>
+                </a:solidFill>
+                <a:latin typeface="Arial"/>
+                <a:ea typeface="ＭＳ Ｐゴシック"/>
+              </a:rPr>
+              <a:t>Mismatch</a:t>
+            </a:r>
+            <a:r>
+              <a:rPr b="0" lang="ca-ES" sz="2000" spc="-1" strike="noStrike">
+                <a:solidFill>
+                  <a:srgbClr val="0059a2"/>
+                </a:solidFill>
+                <a:latin typeface="Arial"/>
+                <a:ea typeface="ＭＳ Ｐゴシック"/>
+              </a:rPr>
+              <a:t>ed </a:t>
+            </a:r>
+            <a:r>
+              <a:rPr b="0" lang="ca-ES" sz="2000" spc="-1" strike="noStrike">
+                <a:solidFill>
+                  <a:srgbClr val="0059a2"/>
+                </a:solidFill>
+                <a:latin typeface="Arial"/>
+                <a:ea typeface="ＭＳ Ｐゴシック"/>
+              </a:rPr>
+              <a:t>regions</a:t>
+            </a:r>
+            <a:endParaRPr b="0" lang="es-ES" sz="2000" spc="-1" strike="noStrike">
+              <a:latin typeface="Arial"/>
+            </a:endParaRPr>
+          </a:p>
+          <a:p>
+            <a:endParaRPr b="0" lang="es-ES" sz="2000" spc="-1" strike="noStrike">
+              <a:latin typeface="Arial"/>
+            </a:endParaRPr>
+          </a:p>
+          <a:p>
+            <a:r>
+              <a:rPr b="0" lang="ca-ES" sz="2000" spc="-1" strike="noStrike">
+                <a:solidFill>
+                  <a:srgbClr val="0059a2"/>
+                </a:solidFill>
+                <a:latin typeface="Arial"/>
+                <a:ea typeface="ＭＳ Ｐゴシック"/>
+              </a:rPr>
+              <a:t>- Great </a:t>
+            </a:r>
+            <a:r>
+              <a:rPr b="0" lang="ca-ES" sz="2000" spc="-1" strike="noStrike">
+                <a:solidFill>
+                  <a:srgbClr val="0059a2"/>
+                </a:solidFill>
+                <a:latin typeface="Arial"/>
+                <a:ea typeface="ＭＳ Ｐゴシック"/>
+              </a:rPr>
+              <a:t>influx to </a:t>
+            </a:r>
+            <a:r>
+              <a:rPr b="0" lang="ca-ES" sz="2000" spc="-1" strike="noStrike">
+                <a:solidFill>
+                  <a:srgbClr val="0059a2"/>
+                </a:solidFill>
+                <a:latin typeface="Arial"/>
+                <a:ea typeface="ＭＳ Ｐゴシック"/>
+              </a:rPr>
+              <a:t>regions </a:t>
+            </a:r>
+            <a:r>
+              <a:rPr b="0" lang="ca-ES" sz="2000" spc="-1" strike="noStrike">
+                <a:solidFill>
+                  <a:srgbClr val="0059a2"/>
+                </a:solidFill>
+                <a:latin typeface="Arial"/>
+                <a:ea typeface="ＭＳ Ｐゴシック"/>
+              </a:rPr>
+              <a:t>with </a:t>
+            </a:r>
+            <a:r>
+              <a:rPr b="0" lang="ca-ES" sz="2000" spc="-1" strike="noStrike">
+                <a:solidFill>
+                  <a:srgbClr val="0059a2"/>
+                </a:solidFill>
+                <a:latin typeface="Arial"/>
+                <a:ea typeface="ＭＳ Ｐゴシック"/>
+              </a:rPr>
+              <a:t>Capital </a:t>
+            </a:r>
+            <a:r>
+              <a:rPr b="0" lang="ca-ES" sz="2000" spc="-1" strike="noStrike">
+                <a:solidFill>
+                  <a:srgbClr val="0059a2"/>
+                </a:solidFill>
+                <a:latin typeface="Arial"/>
+                <a:ea typeface="ＭＳ Ｐゴシック"/>
+              </a:rPr>
+              <a:t>cities</a:t>
+            </a:r>
+            <a:endParaRPr b="0" lang="es-ES" sz="2000" spc="-1" strike="noStrike">
+              <a:latin typeface="Arial"/>
+            </a:endParaRPr>
+          </a:p>
+          <a:p>
+            <a:endParaRPr b="0" lang="es-ES" sz="2000" spc="-1" strike="noStrike">
+              <a:latin typeface="Arial"/>
+            </a:endParaRPr>
+          </a:p>
+          <a:p>
+            <a:r>
+              <a:rPr b="0" lang="ca-ES" sz="2000" spc="-1" strike="noStrike">
+                <a:solidFill>
+                  <a:srgbClr val="0059a2"/>
+                </a:solidFill>
+                <a:latin typeface="Arial"/>
+                <a:ea typeface="ＭＳ Ｐゴシック"/>
+              </a:rPr>
+              <a:t>- </a:t>
+            </a:r>
+            <a:r>
+              <a:rPr b="0" lang="ca-ES" sz="2000" spc="-1" strike="noStrike">
+                <a:solidFill>
+                  <a:srgbClr val="0059a2"/>
+                </a:solidFill>
+                <a:latin typeface="Arial"/>
+                <a:ea typeface="ＭＳ Ｐゴシック"/>
+              </a:rPr>
+              <a:t>Connecti</a:t>
+            </a:r>
+            <a:r>
+              <a:rPr b="0" lang="ca-ES" sz="2000" spc="-1" strike="noStrike">
+                <a:solidFill>
+                  <a:srgbClr val="0059a2"/>
+                </a:solidFill>
+                <a:latin typeface="Arial"/>
+                <a:ea typeface="ＭＳ Ｐゴシック"/>
+              </a:rPr>
+              <a:t>ng </a:t>
+            </a:r>
+            <a:r>
+              <a:rPr b="0" lang="ca-ES" sz="2000" spc="-1" strike="noStrike">
+                <a:solidFill>
+                  <a:srgbClr val="0059a2"/>
+                </a:solidFill>
+                <a:latin typeface="Arial"/>
+                <a:ea typeface="ＭＳ Ｐゴシック"/>
+              </a:rPr>
+              <a:t>regions </a:t>
+            </a:r>
+            <a:r>
+              <a:rPr b="0" lang="ca-ES" sz="2000" spc="-1" strike="noStrike">
+                <a:solidFill>
+                  <a:srgbClr val="0059a2"/>
+                </a:solidFill>
+                <a:latin typeface="Arial"/>
+                <a:ea typeface="ＭＳ Ｐゴシック"/>
+              </a:rPr>
+              <a:t>with more </a:t>
+            </a:r>
+            <a:r>
+              <a:rPr b="0" lang="ca-ES" sz="2000" spc="-1" strike="noStrike">
+                <a:solidFill>
+                  <a:srgbClr val="0059a2"/>
+                </a:solidFill>
+                <a:latin typeface="Arial"/>
+                <a:ea typeface="ＭＳ Ｐゴシック"/>
+              </a:rPr>
+              <a:t>migrants</a:t>
+            </a:r>
+            <a:endParaRPr b="0" lang="es-ES" sz="2000" spc="-1" strike="noStrike">
+              <a:latin typeface="Arial"/>
+            </a:endParaRPr>
+          </a:p>
+          <a:p>
+            <a:endParaRPr b="0" lang="es-ES" sz="2000" spc="-1" strike="noStrike">
+              <a:latin typeface="Arial"/>
+            </a:endParaRPr>
+          </a:p>
+          <a:p>
+            <a:r>
+              <a:rPr b="0" lang="ca-ES" sz="2000" spc="-1" strike="noStrike">
+                <a:solidFill>
+                  <a:srgbClr val="0059a2"/>
+                </a:solidFill>
+                <a:latin typeface="Arial"/>
+                <a:ea typeface="ＭＳ Ｐゴシック"/>
+              </a:rPr>
+              <a:t>- Rural </a:t>
+            </a:r>
+            <a:r>
+              <a:rPr b="0" lang="ca-ES" sz="2000" spc="-1" strike="noStrike">
+                <a:solidFill>
+                  <a:srgbClr val="0059a2"/>
+                </a:solidFill>
+                <a:latin typeface="Arial"/>
+                <a:ea typeface="ＭＳ Ｐゴシック"/>
+              </a:rPr>
+              <a:t>areas </a:t>
+            </a:r>
+            <a:r>
+              <a:rPr b="0" lang="ca-ES" sz="2000" spc="-1" strike="noStrike">
+                <a:solidFill>
+                  <a:srgbClr val="0059a2"/>
+                </a:solidFill>
+                <a:latin typeface="Arial"/>
+                <a:ea typeface="ＭＳ Ｐゴシック"/>
+              </a:rPr>
+              <a:t>with less </a:t>
+            </a:r>
+            <a:r>
+              <a:rPr b="0" lang="ca-ES" sz="2000" spc="-1" strike="noStrike">
+                <a:solidFill>
+                  <a:srgbClr val="0059a2"/>
+                </a:solidFill>
+                <a:latin typeface="Arial"/>
+                <a:ea typeface="ＭＳ Ｐゴシック"/>
+              </a:rPr>
+              <a:t>influx</a:t>
+            </a:r>
+            <a:endParaRPr b="0" lang="es-ES" sz="2000" spc="-1" strike="noStrike">
+              <a:latin typeface="Arial"/>
+            </a:endParaRPr>
+          </a:p>
+          <a:p>
+            <a:endParaRPr b="0" lang="es-ES" sz="2000" spc="-1" strike="noStrike">
+              <a:latin typeface="Arial"/>
+            </a:endParaRPr>
+          </a:p>
+        </p:txBody>
+      </p:sp>
+      <p:grpSp>
+        <p:nvGrpSpPr>
+          <p:cNvPr id="98" name="Group 5"/>
+          <p:cNvGrpSpPr/>
+          <p:nvPr/>
+        </p:nvGrpSpPr>
+        <p:grpSpPr>
+          <a:xfrm>
+            <a:off x="3888000" y="1733760"/>
+            <a:ext cx="5034960" cy="3985560"/>
+            <a:chOff x="3888000" y="1733760"/>
+            <a:chExt cx="5034960" cy="3985560"/>
+          </a:xfrm>
+        </p:grpSpPr>
+        <p:pic>
+          <p:nvPicPr>
+            <p:cNvPr id="99" name="" descr=""/>
+            <p:cNvPicPr/>
+            <p:nvPr/>
+          </p:nvPicPr>
+          <p:blipFill>
+            <a:blip r:embed="rId1"/>
+            <a:stretch/>
+          </p:blipFill>
+          <p:spPr>
+            <a:xfrm>
+              <a:off x="3888000" y="1733760"/>
+              <a:ext cx="5034960" cy="3666240"/>
+            </a:xfrm>
+            <a:prstGeom prst="rect">
+              <a:avLst/>
+            </a:prstGeom>
+            <a:ln>
+              <a:noFill/>
+            </a:ln>
+          </p:spPr>
+        </p:pic>
+        <p:sp>
+          <p:nvSpPr>
+            <p:cNvPr id="100" name="TextShape 6"/>
+            <p:cNvSpPr txBox="1"/>
+            <p:nvPr/>
+          </p:nvSpPr>
+          <p:spPr>
+            <a:xfrm>
+              <a:off x="4223520" y="5400000"/>
+              <a:ext cx="4575600" cy="319320"/>
+            </a:xfrm>
+            <a:prstGeom prst="rect">
+              <a:avLst/>
+            </a:prstGeom>
+            <a:noFill/>
+            <a:ln>
+              <a:noFill/>
+            </a:ln>
+          </p:spPr>
+          <p:txBody>
+            <a:bodyPr lIns="90000" rIns="90000" tIns="45000" bIns="45000">
+              <a:noAutofit/>
+            </a:bodyPr>
+            <a:p>
+              <a:r>
+                <a:rPr b="0" lang="en-US" sz="800" spc="-1" strike="noStrike">
+                  <a:latin typeface="Arial"/>
+                </a:rPr>
+                <a:t>Figure: Catalunya’s </a:t>
+              </a:r>
+              <a:r>
+                <a:rPr b="0" lang="en-US" sz="800" spc="-1" strike="noStrike">
+                  <a:latin typeface="Arial"/>
+                </a:rPr>
+                <a:t>map according to </a:t>
+              </a:r>
+              <a:r>
+                <a:rPr b="0" lang="en-US" sz="800" spc="-1" strike="noStrike">
+                  <a:latin typeface="Arial"/>
+                </a:rPr>
+                <a:t>Vaguerie’s territorial </a:t>
+              </a:r>
+              <a:r>
+                <a:rPr b="0" lang="en-US" sz="800" spc="-1" strike="noStrike">
+                  <a:latin typeface="Arial"/>
+                </a:rPr>
+                <a:t>division. The color code </a:t>
+              </a:r>
+              <a:r>
+                <a:rPr b="0" lang="en-US" sz="800" spc="-1" strike="noStrike">
+                  <a:latin typeface="Arial"/>
+                </a:rPr>
+                <a:t>shows the influx amiunt </a:t>
+              </a:r>
+              <a:r>
+                <a:rPr b="0" lang="en-US" sz="800" spc="-1" strike="noStrike">
+                  <a:latin typeface="Arial"/>
+                </a:rPr>
+                <a:t>of migrants received </a:t>
+              </a:r>
+              <a:r>
+                <a:rPr b="0" lang="en-US" sz="800" spc="-1" strike="noStrike">
+                  <a:latin typeface="Arial"/>
+                </a:rPr>
+                <a:t>since 2015.</a:t>
+              </a:r>
+              <a:endParaRPr b="0" lang="es-ES" sz="800" spc="-1" strike="noStrike">
+                <a:latin typeface="Arial"/>
+              </a:endParaRPr>
+            </a:p>
+          </p:txBody>
+        </p:sp>
+      </p:grpSp>
+    </p:spTree>
+  </p:cSld>
+  <mc:AlternateContent>
+    <mc:Choice Requires="p14">
+      <p:transition spd="slow" p14:dur="2000"/>
+    </mc:Choice>
+    <mc:Fallback>
+      <p:transition spd="slow"/>
+    </mc:Fallback>
+  </mc:AlternateContent>
+</p:sld>
+</file>
+
+<file path=ppt/slides/slide5.xml><?xml version="1.0" encoding="utf-8"?>
+<p:sld xmlns:a="http://schemas.openxmlformats.org/drawingml/2006/main" xmlns:p="http://schemas.openxmlformats.org/presentationml/2006/main" xmlns:r="http://schemas.openxmlformats.org/officeDocument/2006/relationships" xmlns:p14="http://schemas.microsoft.com/office/powerpoint/2010/main" xmlns:p15="http://schemas.microsoft.com/office/powerpoint/2012/main" xmlns:mc="http://schemas.openxmlformats.org/markup-compatibility/2006">
+  <p:cSld>
+    <p:spTree>
+      <p:nvGrpSpPr>
+        <p:cNvPr id="1" name=""/>
+        <p:cNvGrpSpPr/>
+        <p:nvPr/>
+      </p:nvGrpSpPr>
+      <p:grpSpPr>
+        <a:xfrm>
+          <a:off x="0" y="0"/>
+          <a:ext cx="0" cy="0"/>
+          <a:chOff x="0" y="0"/>
+          <a:chExt cx="0" cy="0"/>
+        </a:xfrm>
+      </p:grpSpPr>
+      <p:sp>
+        <p:nvSpPr>
+          <p:cNvPr id="101" name="CustomShape 1"/>
           <p:cNvSpPr/>
           <p:nvPr/>
         </p:nvSpPr>
         <p:spPr>
           <a:xfrm>
-            <a:off x="288000" y="536400"/>
-            <a:ext cx="5197680" cy="227880"/>
+            <a:off x="288000" y="1099440"/>
+            <a:ext cx="8566920" cy="456120"/>
           </a:xfrm>
           <a:prstGeom prst="rect">
             <a:avLst/>
@@ -5155,7 +5638,163 @@
             <a:noAutofit/>
           </a:bodyPr>
           <a:p>
-            <a:pPr marL="343080" indent="-342360">
+            <a:pPr>
+              <a:lnSpc>
+                <a:spcPct val="100000"/>
+              </a:lnSpc>
+            </a:pPr>
+            <a:r>
+              <a:rPr b="1" lang="es-ES" sz="2000" spc="-1" strike="noStrike">
+                <a:solidFill>
+                  <a:srgbClr val="0059a2"/>
+                </a:solidFill>
+                <a:latin typeface="Arial"/>
+                <a:ea typeface="ＭＳ Ｐゴシック"/>
+              </a:rPr>
+              <a:t>Author contributions - CRediT Contributor Roles Taxonomy </a:t>
+            </a:r>
+            <a:endParaRPr b="0" lang="es-ES" sz="2000" spc="-1" strike="noStrike">
+              <a:latin typeface="Arial"/>
+            </a:endParaRPr>
+          </a:p>
+        </p:txBody>
+      </p:sp>
+      <p:sp>
+        <p:nvSpPr>
+          <p:cNvPr id="102" name="CustomShape 2"/>
+          <p:cNvSpPr/>
+          <p:nvPr/>
+        </p:nvSpPr>
+        <p:spPr>
+          <a:xfrm>
+            <a:off x="8610480" y="6356520"/>
+            <a:ext cx="245160" cy="363960"/>
+          </a:xfrm>
+          <a:prstGeom prst="rect">
+            <a:avLst/>
+          </a:prstGeom>
+          <a:noFill/>
+          <a:ln>
+            <a:noFill/>
+          </a:ln>
+        </p:spPr>
+        <p:style>
+          <a:lnRef idx="0"/>
+          <a:fillRef idx="0"/>
+          <a:effectRef idx="0"/>
+          <a:fontRef idx="minor"/>
+        </p:style>
+        <p:txBody>
+          <a:bodyPr lIns="0" rIns="0" tIns="0" bIns="0">
+            <a:noAutofit/>
+          </a:bodyPr>
+          <a:p>
+            <a:pPr algn="r">
+              <a:lnSpc>
+                <a:spcPct val="100000"/>
+              </a:lnSpc>
+            </a:pPr>
+            <a:fld id="{430282C7-DFC7-44D6-B57E-D3EF3FE1E39F}" type="slidenum">
+              <a:rPr b="0" lang="es-ES_tradnl" sz="800" spc="-1" strike="noStrike">
+                <a:solidFill>
+                  <a:srgbClr val="000000"/>
+                </a:solidFill>
+                <a:latin typeface="Arial"/>
+                <a:ea typeface="ＭＳ Ｐゴシック"/>
+              </a:rPr>
+              <a:t>&lt;número&gt;</a:t>
+            </a:fld>
+            <a:endParaRPr b="0" lang="es-ES" sz="800" spc="-1" strike="noStrike">
+              <a:latin typeface="Arial"/>
+            </a:endParaRPr>
+          </a:p>
+        </p:txBody>
+      </p:sp>
+      <p:sp>
+        <p:nvSpPr>
+          <p:cNvPr id="103" name="CustomShape 3"/>
+          <p:cNvSpPr/>
+          <p:nvPr/>
+        </p:nvSpPr>
+        <p:spPr>
+          <a:xfrm>
+            <a:off x="288000" y="417600"/>
+            <a:ext cx="5197320" cy="114840"/>
+          </a:xfrm>
+          <a:prstGeom prst="rect">
+            <a:avLst/>
+          </a:prstGeom>
+          <a:noFill/>
+          <a:ln>
+            <a:noFill/>
+          </a:ln>
+        </p:spPr>
+        <p:style>
+          <a:lnRef idx="0"/>
+          <a:fillRef idx="0"/>
+          <a:effectRef idx="0"/>
+          <a:fontRef idx="minor"/>
+        </p:style>
+        <p:txBody>
+          <a:bodyPr lIns="0" rIns="0" tIns="0" bIns="0">
+            <a:noAutofit/>
+          </a:bodyPr>
+          <a:p>
+            <a:pPr marL="343080" indent="-342000">
+              <a:lnSpc>
+                <a:spcPts val="1001"/>
+              </a:lnSpc>
+              <a:tabLst>
+                <a:tab algn="l" pos="0"/>
+              </a:tabLst>
+            </a:pPr>
+            <a:r>
+              <a:rPr b="1" lang="es-ES" sz="800" spc="-1" strike="noStrike">
+                <a:solidFill>
+                  <a:srgbClr val="000000"/>
+                </a:solidFill>
+                <a:latin typeface="Arial"/>
+                <a:ea typeface="ＭＳ Ｐゴシック"/>
+              </a:rPr>
+              <a:t>MSc Physics of Complex Systems and Biophysics</a:t>
+            </a:r>
+            <a:endParaRPr b="0" lang="es-ES" sz="800" spc="-1" strike="noStrike">
+              <a:latin typeface="Arial"/>
+            </a:endParaRPr>
+          </a:p>
+        </p:txBody>
+      </p:sp>
+      <p:sp>
+        <p:nvSpPr>
+          <p:cNvPr id="104" name="CustomShape 4"/>
+          <p:cNvSpPr/>
+          <p:nvPr/>
+        </p:nvSpPr>
+        <p:spPr>
+          <a:xfrm>
+            <a:off x="288000" y="536400"/>
+            <a:ext cx="5197320" cy="227520"/>
+          </a:xfrm>
+          <a:prstGeom prst="rect">
+            <a:avLst/>
+          </a:prstGeom>
+          <a:noFill/>
+          <a:ln>
+            <a:noFill/>
+          </a:ln>
+        </p:spPr>
+        <p:style>
+          <a:lnRef idx="0"/>
+          <a:fillRef idx="0"/>
+          <a:effectRef idx="0"/>
+          <a:fontRef idx="minor"/>
+        </p:style>
+        <p:txBody>
+          <a:bodyPr lIns="0" rIns="0" tIns="0" bIns="0">
+            <a:noAutofit/>
+          </a:bodyPr>
+          <a:p>
+            <a:pPr marL="343080" indent="-342000">
               <a:lnSpc>
                 <a:spcPct val="100000"/>
               </a:lnSpc>
@@ -5197,14 +5836,14 @@
       </p:sp>
       <p:sp>
         <p:nvSpPr>
-          <p:cNvPr id="98" name="CustomShape 5"/>
+          <p:cNvPr id="105" name="CustomShape 5"/>
           <p:cNvSpPr/>
           <p:nvPr/>
         </p:nvSpPr>
         <p:spPr>
           <a:xfrm>
             <a:off x="201240" y="1535760"/>
-            <a:ext cx="8567280" cy="272520"/>
+            <a:ext cx="8566920" cy="272160"/>
           </a:xfrm>
           <a:prstGeom prst="rect">
             <a:avLst/>
@@ -5260,7 +5899,7 @@
       </p:sp>
       <p:graphicFrame>
         <p:nvGraphicFramePr>
-          <p:cNvPr id="99" name="Table 6"/>
+          <p:cNvPr id="106" name="Table 6"/>
           <p:cNvGraphicFramePr/>
           <p:nvPr/>
         </p:nvGraphicFramePr>
@@ -6645,7 +7284,7 @@
 </p:sld>
 </file>
 
-<file path=ppt/slides/slide5.xml><?xml version="1.0" encoding="utf-8"?>
+<file path=ppt/slides/slide6.xml><?xml version="1.0" encoding="utf-8"?>
 <p:sld xmlns:a="http://schemas.openxmlformats.org/drawingml/2006/main" xmlns:p="http://schemas.openxmlformats.org/presentationml/2006/main" xmlns:r="http://schemas.openxmlformats.org/officeDocument/2006/relationships" xmlns:p14="http://schemas.microsoft.com/office/powerpoint/2010/main" xmlns:p15="http://schemas.microsoft.com/office/powerpoint/2012/main" xmlns:mc="http://schemas.openxmlformats.org/markup-compatibility/2006">
   <p:cSld>
     <p:spTree>
@@ -6664,14 +7303,14 @@
       </p:grpSpPr>
       <p:sp>
         <p:nvSpPr>
-          <p:cNvPr id="100" name="CustomShape 1"/>
+          <p:cNvPr id="107" name="CustomShape 1"/>
           <p:cNvSpPr/>
           <p:nvPr/>
         </p:nvSpPr>
         <p:spPr>
           <a:xfrm>
             <a:off x="288000" y="1099440"/>
-            <a:ext cx="8567280" cy="456480"/>
+            <a:ext cx="8566920" cy="456120"/>
           </a:xfrm>
           <a:prstGeom prst="rect">
             <a:avLst/>
@@ -6715,14 +7354,14 @@
       </p:sp>
       <p:sp>
         <p:nvSpPr>
-          <p:cNvPr id="101" name="CustomShape 2"/>
+          <p:cNvPr id="108" name="CustomShape 2"/>
           <p:cNvSpPr/>
           <p:nvPr/>
         </p:nvSpPr>
         <p:spPr>
           <a:xfrm>
             <a:off x="8610480" y="6356520"/>
-            <a:ext cx="245520" cy="364320"/>
+            <a:ext cx="245160" cy="363960"/>
           </a:xfrm>
           <a:prstGeom prst="rect">
             <a:avLst/>
@@ -6748,7 +7387,7 @@
                 <a:spcPct val="100000"/>
               </a:lnSpc>
             </a:pPr>
-            <a:fld id="{7E6E9ABC-7420-4C7B-92C1-68925B9DDA81}" type="slidenum">
+            <a:fld id="{9F2A9FF6-B8D9-4D0E-8179-FDADFF6DF73C}" type="slidenum">
               <a:rPr b="0" lang="es-ES_tradnl" sz="800" spc="-1" strike="noStrike">
                 <a:solidFill>
                   <a:srgbClr val="000000"/>
@@ -6766,14 +7405,14 @@
       </p:sp>
       <p:sp>
         <p:nvSpPr>
-          <p:cNvPr id="102" name="CustomShape 3"/>
+          <p:cNvPr id="109" name="CustomShape 3"/>
           <p:cNvSpPr/>
           <p:nvPr/>
         </p:nvSpPr>
         <p:spPr>
           <a:xfrm>
             <a:off x="288000" y="417600"/>
-            <a:ext cx="5197680" cy="115200"/>
+            <a:ext cx="5197320" cy="114840"/>
           </a:xfrm>
           <a:prstGeom prst="rect">
             <a:avLst/>
@@ -6794,7 +7433,7 @@
             <a:noAutofit/>
           </a:bodyPr>
           <a:p>
-            <a:pPr marL="343080" indent="-342360">
+            <a:pPr marL="343080" indent="-342000">
               <a:lnSpc>
                 <a:spcPts val="1001"/>
               </a:lnSpc>
@@ -6820,14 +7459,14 @@
       </p:sp>
       <p:sp>
         <p:nvSpPr>
-          <p:cNvPr id="103" name="CustomShape 4"/>
+          <p:cNvPr id="110" name="CustomShape 4"/>
           <p:cNvSpPr/>
           <p:nvPr/>
         </p:nvSpPr>
         <p:spPr>
           <a:xfrm>
             <a:off x="288000" y="536400"/>
-            <a:ext cx="5197680" cy="227880"/>
+            <a:ext cx="5197320" cy="227520"/>
           </a:xfrm>
           <a:prstGeom prst="rect">
             <a:avLst/>
@@ -6848,7 +7487,7 @@
             <a:noAutofit/>
           </a:bodyPr>
           <a:p>
-            <a:pPr marL="343080" indent="-342360">
+            <a:pPr marL="343080" indent="-342000">
               <a:lnSpc>
                 <a:spcPct val="100000"/>
               </a:lnSpc>
@@ -6890,13 +7529,13 @@
       </p:sp>
       <p:graphicFrame>
         <p:nvGraphicFramePr>
-          <p:cNvPr id="104" name="Table 5"/>
+          <p:cNvPr id="111" name="Table 5"/>
           <p:cNvGraphicFramePr/>
           <p:nvPr/>
         </p:nvGraphicFramePr>
         <p:xfrm>
           <a:off x="229320" y="1815120"/>
-          <a:ext cx="8496360" cy="4723560"/>
+          <a:ext cx="8496360" cy="4723200"/>
         </p:xfrm>
         <a:graphic>
           <a:graphicData uri="http://schemas.openxmlformats.org/drawingml/2006/table">
@@ -9513,7 +10152,7 @@
                   </a:tcPr>
                 </a:tc>
               </a:tr>
-              <a:tr h="403560">
+              <a:tr h="403200">
                 <a:tc>
                   <a:txBody>
                     <a:bodyPr>

</xml_diff>